<commit_message>
adding image files in various sizes to provide fitting image pixmaps as app icons
</commit_message>
<xml_diff>
--- a/files/icons/icons.pptx
+++ b/files/icons/icons.pptx
@@ -14,6 +14,7 @@
     <p:sldId id="263" r:id="rId8"/>
     <p:sldId id="262" r:id="rId9"/>
     <p:sldId id="264" r:id="rId10"/>
+    <p:sldId id="265" r:id="rId11"/>
   </p:sldIdLst>
   <p:sldSz cx="12192000" cy="6858000"/>
   <p:notesSz cx="6858000" cy="9144000"/>
@@ -267,7 +268,7 @@
           <a:p>
             <a:fld id="{C4B95F18-FC4C-4838-A23D-C12CD27FD480}" type="datetimeFigureOut">
               <a:rPr lang="de-DE" smtClean="0"/>
-              <a:t>04.07.2020</a:t>
+              <a:t>17.07.2020</a:t>
             </a:fld>
             <a:endParaRPr lang="de-DE"/>
           </a:p>
@@ -465,7 +466,7 @@
           <a:p>
             <a:fld id="{C4B95F18-FC4C-4838-A23D-C12CD27FD480}" type="datetimeFigureOut">
               <a:rPr lang="de-DE" smtClean="0"/>
-              <a:t>04.07.2020</a:t>
+              <a:t>17.07.2020</a:t>
             </a:fld>
             <a:endParaRPr lang="de-DE"/>
           </a:p>
@@ -673,7 +674,7 @@
           <a:p>
             <a:fld id="{C4B95F18-FC4C-4838-A23D-C12CD27FD480}" type="datetimeFigureOut">
               <a:rPr lang="de-DE" smtClean="0"/>
-              <a:t>04.07.2020</a:t>
+              <a:t>17.07.2020</a:t>
             </a:fld>
             <a:endParaRPr lang="de-DE"/>
           </a:p>
@@ -871,7 +872,7 @@
           <a:p>
             <a:fld id="{C4B95F18-FC4C-4838-A23D-C12CD27FD480}" type="datetimeFigureOut">
               <a:rPr lang="de-DE" smtClean="0"/>
-              <a:t>04.07.2020</a:t>
+              <a:t>17.07.2020</a:t>
             </a:fld>
             <a:endParaRPr lang="de-DE"/>
           </a:p>
@@ -1146,7 +1147,7 @@
           <a:p>
             <a:fld id="{C4B95F18-FC4C-4838-A23D-C12CD27FD480}" type="datetimeFigureOut">
               <a:rPr lang="de-DE" smtClean="0"/>
-              <a:t>04.07.2020</a:t>
+              <a:t>17.07.2020</a:t>
             </a:fld>
             <a:endParaRPr lang="de-DE"/>
           </a:p>
@@ -1411,7 +1412,7 @@
           <a:p>
             <a:fld id="{C4B95F18-FC4C-4838-A23D-C12CD27FD480}" type="datetimeFigureOut">
               <a:rPr lang="de-DE" smtClean="0"/>
-              <a:t>04.07.2020</a:t>
+              <a:t>17.07.2020</a:t>
             </a:fld>
             <a:endParaRPr lang="de-DE"/>
           </a:p>
@@ -1823,7 +1824,7 @@
           <a:p>
             <a:fld id="{C4B95F18-FC4C-4838-A23D-C12CD27FD480}" type="datetimeFigureOut">
               <a:rPr lang="de-DE" smtClean="0"/>
-              <a:t>04.07.2020</a:t>
+              <a:t>17.07.2020</a:t>
             </a:fld>
             <a:endParaRPr lang="de-DE"/>
           </a:p>
@@ -1964,7 +1965,7 @@
           <a:p>
             <a:fld id="{C4B95F18-FC4C-4838-A23D-C12CD27FD480}" type="datetimeFigureOut">
               <a:rPr lang="de-DE" smtClean="0"/>
-              <a:t>04.07.2020</a:t>
+              <a:t>17.07.2020</a:t>
             </a:fld>
             <a:endParaRPr lang="de-DE"/>
           </a:p>
@@ -2077,7 +2078,7 @@
           <a:p>
             <a:fld id="{C4B95F18-FC4C-4838-A23D-C12CD27FD480}" type="datetimeFigureOut">
               <a:rPr lang="de-DE" smtClean="0"/>
-              <a:t>04.07.2020</a:t>
+              <a:t>17.07.2020</a:t>
             </a:fld>
             <a:endParaRPr lang="de-DE"/>
           </a:p>
@@ -2388,7 +2389,7 @@
           <a:p>
             <a:fld id="{C4B95F18-FC4C-4838-A23D-C12CD27FD480}" type="datetimeFigureOut">
               <a:rPr lang="de-DE" smtClean="0"/>
-              <a:t>04.07.2020</a:t>
+              <a:t>17.07.2020</a:t>
             </a:fld>
             <a:endParaRPr lang="de-DE"/>
           </a:p>
@@ -2676,7 +2677,7 @@
           <a:p>
             <a:fld id="{C4B95F18-FC4C-4838-A23D-C12CD27FD480}" type="datetimeFigureOut">
               <a:rPr lang="de-DE" smtClean="0"/>
-              <a:t>04.07.2020</a:t>
+              <a:t>17.07.2020</a:t>
             </a:fld>
             <a:endParaRPr lang="de-DE"/>
           </a:p>
@@ -2917,7 +2918,7 @@
           <a:p>
             <a:fld id="{C4B95F18-FC4C-4838-A23D-C12CD27FD480}" type="datetimeFigureOut">
               <a:rPr lang="de-DE" smtClean="0"/>
-              <a:t>04.07.2020</a:t>
+              <a:t>17.07.2020</a:t>
             </a:fld>
             <a:endParaRPr lang="de-DE"/>
           </a:p>
@@ -3386,6 +3387,107 @@
 </p:sld>
 </file>
 
+<file path=ppt/slides/slide10.xml><?xml version="1.0" encoding="utf-8"?>
+<p:sld xmlns:a="http://schemas.openxmlformats.org/drawingml/2006/main" xmlns:r="http://schemas.openxmlformats.org/officeDocument/2006/relationships" xmlns:p="http://schemas.openxmlformats.org/presentationml/2006/main">
+  <p:cSld>
+    <p:spTree>
+      <p:nvGrpSpPr>
+        <p:cNvPr id="1" name=""/>
+        <p:cNvGrpSpPr/>
+        <p:nvPr/>
+      </p:nvGrpSpPr>
+      <p:grpSpPr>
+        <a:xfrm>
+          <a:off x="0" y="0"/>
+          <a:ext cx="0" cy="0"/>
+          <a:chOff x="0" y="0"/>
+          <a:chExt cx="0" cy="0"/>
+        </a:xfrm>
+      </p:grpSpPr>
+      <p:pic>
+        <p:nvPicPr>
+          <p:cNvPr id="2" name="Grafik 1" descr="Geist">
+            <a:extLst>
+              <a:ext uri="{FF2B5EF4-FFF2-40B4-BE49-F238E27FC236}">
+                <a16:creationId xmlns:a16="http://schemas.microsoft.com/office/drawing/2014/main" id="{8C3C4EE6-7CEC-46B8-A1E5-12053CA7DB68}"/>
+              </a:ext>
+            </a:extLst>
+          </p:cNvPr>
+          <p:cNvPicPr>
+            <a:picLocks noChangeAspect="1"/>
+          </p:cNvPicPr>
+          <p:nvPr/>
+        </p:nvPicPr>
+        <p:blipFill>
+          <a:blip r:embed="rId2">
+            <a:extLst>
+              <a:ext uri="{96DAC541-7B7A-43D3-8B79-37D633B846F1}">
+                <asvg:svgBlip xmlns:asvg="http://schemas.microsoft.com/office/drawing/2016/SVG/main" r:embed="rId3"/>
+              </a:ext>
+            </a:extLst>
+          </a:blip>
+          <a:stretch>
+            <a:fillRect/>
+          </a:stretch>
+        </p:blipFill>
+        <p:spPr>
+          <a:xfrm>
+            <a:off x="410025" y="345113"/>
+            <a:ext cx="914400" cy="914400"/>
+          </a:xfrm>
+          <a:prstGeom prst="rect">
+            <a:avLst/>
+          </a:prstGeom>
+        </p:spPr>
+      </p:pic>
+      <p:sp>
+        <p:nvSpPr>
+          <p:cNvPr id="4" name="Textfeld 3">
+            <a:extLst>
+              <a:ext uri="{FF2B5EF4-FFF2-40B4-BE49-F238E27FC236}">
+                <a16:creationId xmlns:a16="http://schemas.microsoft.com/office/drawing/2014/main" id="{B0E8F552-6E6D-4B59-8E4D-C5FC699B07AB}"/>
+              </a:ext>
+            </a:extLst>
+          </p:cNvPr>
+          <p:cNvSpPr txBox="1"/>
+          <p:nvPr/>
+        </p:nvSpPr>
+        <p:spPr>
+          <a:xfrm>
+            <a:off x="410025" y="1316759"/>
+            <a:ext cx="914401" cy="369332"/>
+          </a:xfrm>
+          <a:prstGeom prst="rect">
+            <a:avLst/>
+          </a:prstGeom>
+          <a:noFill/>
+        </p:spPr>
+        <p:txBody>
+          <a:bodyPr wrap="square" rtlCol="0">
+            <a:spAutoFit/>
+          </a:bodyPr>
+          <a:lstStyle/>
+          <a:p>
+            <a:r>
+              <a:rPr lang="de-DE" dirty="0"/>
+              <a:t>96x96</a:t>
+            </a:r>
+          </a:p>
+        </p:txBody>
+      </p:sp>
+    </p:spTree>
+    <p:extLst>
+      <p:ext uri="{BB962C8B-B14F-4D97-AF65-F5344CB8AC3E}">
+        <p14:creationId xmlns:p14="http://schemas.microsoft.com/office/powerpoint/2010/main" val="3973787615"/>
+      </p:ext>
+    </p:extLst>
+  </p:cSld>
+  <p:clrMapOvr>
+    <a:masterClrMapping/>
+  </p:clrMapOvr>
+</p:sld>
+</file>
+
 <file path=ppt/slides/slide2.xml><?xml version="1.0" encoding="utf-8"?>
 <p:sld xmlns:a="http://schemas.openxmlformats.org/drawingml/2006/main" xmlns:r="http://schemas.openxmlformats.org/officeDocument/2006/relationships" xmlns:p="http://schemas.openxmlformats.org/presentationml/2006/main">
   <p:cSld>

</xml_diff>